<commit_message>
updated system architecture in system architecture folder updated pptx and jpeg
</commit_message>
<xml_diff>
--- a/Gradient Boosting/system architecture.pptx
+++ b/Gradient Boosting/system architecture.pptx
@@ -6,6 +6,8 @@
   </p:sldMasterIdLst>
   <p:sldIdLst>
     <p:sldId id="256" r:id="rId2"/>
+    <p:sldId id="257" r:id="rId3"/>
+    <p:sldId id="258" r:id="rId4"/>
   </p:sldIdLst>
   <p:sldSz cx="12192000" cy="6858000"/>
   <p:notesSz cx="6858000" cy="9144000"/>
@@ -104,7 +106,16 @@
       </a:defRPr>
     </a:lvl9pPr>
   </p:defaultTextStyle>
+  <p:extLst>
+    <p:ext uri="{EFAFB233-063F-42B5-8137-9DF3F51BA10A}">
+      <p15:sldGuideLst xmlns:p15="http://schemas.microsoft.com/office/powerpoint/2012/main"/>
+    </p:ext>
+  </p:extLst>
 </p:presentation>
+</file>
+
+<file path=ppt/revisionInfo.xml><?xml version="1.0" encoding="utf-8"?>
+<p1510:revInfo xmlns:a="http://schemas.openxmlformats.org/drawingml/2006/main" xmlns:r="http://schemas.openxmlformats.org/officeDocument/2006/relationships" xmlns:p1510="http://schemas.microsoft.com/office/powerpoint/2015/10/main"/>
 </file>
 
 <file path=ppt/slideLayouts/slideLayout1.xml><?xml version="1.0" encoding="utf-8"?>
@@ -254,7 +265,7 @@
           <a:p>
             <a:fld id="{59404295-AB7E-499C-9B86-DD6B20C5A5AF}" type="datetimeFigureOut">
               <a:rPr lang="en-US" smtClean="0"/>
-              <a:t>8/21/2017</a:t>
+              <a:t>9/5/2017</a:t>
             </a:fld>
             <a:endParaRPr lang="en-US"/>
           </a:p>
@@ -452,7 +463,7 @@
           <a:p>
             <a:fld id="{59404295-AB7E-499C-9B86-DD6B20C5A5AF}" type="datetimeFigureOut">
               <a:rPr lang="en-US" smtClean="0"/>
-              <a:t>8/21/2017</a:t>
+              <a:t>9/5/2017</a:t>
             </a:fld>
             <a:endParaRPr lang="en-US"/>
           </a:p>
@@ -660,7 +671,7 @@
           <a:p>
             <a:fld id="{59404295-AB7E-499C-9B86-DD6B20C5A5AF}" type="datetimeFigureOut">
               <a:rPr lang="en-US" smtClean="0"/>
-              <a:t>8/21/2017</a:t>
+              <a:t>9/5/2017</a:t>
             </a:fld>
             <a:endParaRPr lang="en-US"/>
           </a:p>
@@ -858,7 +869,7 @@
           <a:p>
             <a:fld id="{59404295-AB7E-499C-9B86-DD6B20C5A5AF}" type="datetimeFigureOut">
               <a:rPr lang="en-US" smtClean="0"/>
-              <a:t>8/21/2017</a:t>
+              <a:t>9/5/2017</a:t>
             </a:fld>
             <a:endParaRPr lang="en-US"/>
           </a:p>
@@ -1133,7 +1144,7 @@
           <a:p>
             <a:fld id="{59404295-AB7E-499C-9B86-DD6B20C5A5AF}" type="datetimeFigureOut">
               <a:rPr lang="en-US" smtClean="0"/>
-              <a:t>8/21/2017</a:t>
+              <a:t>9/5/2017</a:t>
             </a:fld>
             <a:endParaRPr lang="en-US"/>
           </a:p>
@@ -1398,7 +1409,7 @@
           <a:p>
             <a:fld id="{59404295-AB7E-499C-9B86-DD6B20C5A5AF}" type="datetimeFigureOut">
               <a:rPr lang="en-US" smtClean="0"/>
-              <a:t>8/21/2017</a:t>
+              <a:t>9/5/2017</a:t>
             </a:fld>
             <a:endParaRPr lang="en-US"/>
           </a:p>
@@ -1810,7 +1821,7 @@
           <a:p>
             <a:fld id="{59404295-AB7E-499C-9B86-DD6B20C5A5AF}" type="datetimeFigureOut">
               <a:rPr lang="en-US" smtClean="0"/>
-              <a:t>8/21/2017</a:t>
+              <a:t>9/5/2017</a:t>
             </a:fld>
             <a:endParaRPr lang="en-US"/>
           </a:p>
@@ -1951,7 +1962,7 @@
           <a:p>
             <a:fld id="{59404295-AB7E-499C-9B86-DD6B20C5A5AF}" type="datetimeFigureOut">
               <a:rPr lang="en-US" smtClean="0"/>
-              <a:t>8/21/2017</a:t>
+              <a:t>9/5/2017</a:t>
             </a:fld>
             <a:endParaRPr lang="en-US"/>
           </a:p>
@@ -2064,7 +2075,7 @@
           <a:p>
             <a:fld id="{59404295-AB7E-499C-9B86-DD6B20C5A5AF}" type="datetimeFigureOut">
               <a:rPr lang="en-US" smtClean="0"/>
-              <a:t>8/21/2017</a:t>
+              <a:t>9/5/2017</a:t>
             </a:fld>
             <a:endParaRPr lang="en-US"/>
           </a:p>
@@ -2375,7 +2386,7 @@
           <a:p>
             <a:fld id="{59404295-AB7E-499C-9B86-DD6B20C5A5AF}" type="datetimeFigureOut">
               <a:rPr lang="en-US" smtClean="0"/>
-              <a:t>8/21/2017</a:t>
+              <a:t>9/5/2017</a:t>
             </a:fld>
             <a:endParaRPr lang="en-US"/>
           </a:p>
@@ -2663,7 +2674,7 @@
           <a:p>
             <a:fld id="{59404295-AB7E-499C-9B86-DD6B20C5A5AF}" type="datetimeFigureOut">
               <a:rPr lang="en-US" smtClean="0"/>
-              <a:t>8/21/2017</a:t>
+              <a:t>9/5/2017</a:t>
             </a:fld>
             <a:endParaRPr lang="en-US"/>
           </a:p>
@@ -2904,7 +2915,7 @@
           <a:p>
             <a:fld id="{59404295-AB7E-499C-9B86-DD6B20C5A5AF}" type="datetimeFigureOut">
               <a:rPr lang="en-US" smtClean="0"/>
-              <a:t>8/21/2017</a:t>
+              <a:t>9/5/2017</a:t>
             </a:fld>
             <a:endParaRPr lang="en-US"/>
           </a:p>
@@ -3613,8 +3624,8 @@
         </p:nvSpPr>
         <p:spPr>
           <a:xfrm>
-            <a:off x="9071634" y="2082271"/>
-            <a:ext cx="2455333" cy="1479081"/>
+            <a:off x="8994632" y="1536837"/>
+            <a:ext cx="2455333" cy="2569950"/>
           </a:xfrm>
           <a:prstGeom prst="rect">
             <a:avLst/>
@@ -3645,18 +3656,45 @@
             </a:r>
           </a:p>
           <a:p>
+            <a:pPr marL="285750" indent="-285750" algn="ctr">
+              <a:buFont typeface="Arial" panose="020B0604020202020204" pitchFamily="34" charset="0"/>
+              <a:buChar char="•"/>
+            </a:pPr>
+            <a:r>
+              <a:rPr lang="en-US" dirty="0"/>
+              <a:t>Positive</a:t>
+            </a:r>
+          </a:p>
+          <a:p>
             <a:pPr algn="ctr"/>
             <a:r>
               <a:rPr lang="en-US" dirty="0"/>
-              <a:t>( Negative, </a:t>
+              <a:t> (Stage of Celiac disease)</a:t>
+            </a:r>
+          </a:p>
+          <a:p>
+            <a:pPr marL="285750" indent="-285750" algn="ctr">
+              <a:buFont typeface="Arial" panose="020B0604020202020204" pitchFamily="34" charset="0"/>
+              <a:buChar char="•"/>
+            </a:pPr>
+            <a:r>
+              <a:rPr lang="en-US" dirty="0"/>
+              <a:t>	</a:t>
+            </a:r>
+          </a:p>
+          <a:p>
+            <a:pPr marL="285750" indent="-285750" algn="ctr">
+              <a:buFont typeface="Arial" panose="020B0604020202020204" pitchFamily="34" charset="0"/>
+              <a:buChar char="•"/>
+            </a:pPr>
+            <a:r>
+              <a:rPr lang="en-US" dirty="0"/>
+              <a:t>Negative</a:t>
             </a:r>
           </a:p>
           <a:p>
             <a:pPr algn="ctr"/>
-            <a:r>
-              <a:rPr lang="en-US" dirty="0"/>
-              <a:t>Probability ( Degree ) )</a:t>
-            </a:r>
+            <a:endParaRPr lang="en-US" dirty="0"/>
           </a:p>
         </p:txBody>
       </p:sp>
@@ -3679,7 +3717,7 @@
         <p:spPr>
           <a:xfrm>
             <a:off x="7338193" y="2821812"/>
-            <a:ext cx="1733441" cy="0"/>
+            <a:ext cx="1656439" cy="0"/>
           </a:xfrm>
           <a:prstGeom prst="straightConnector1">
             <a:avLst/>
@@ -3919,7 +3957,7 @@
             <a:pPr algn="ctr"/>
             <a:r>
               <a:rPr lang="en-US" dirty="0"/>
-              <a:t>Live model</a:t>
+              <a:t>Classifier</a:t>
             </a:r>
           </a:p>
         </p:txBody>
@@ -4054,6 +4092,1850 @@
     <p:extLst>
       <p:ext uri="{BB962C8B-B14F-4D97-AF65-F5344CB8AC3E}">
         <p14:creationId xmlns:p14="http://schemas.microsoft.com/office/powerpoint/2010/main" val="3254419581"/>
+      </p:ext>
+    </p:extLst>
+  </p:cSld>
+  <p:clrMapOvr>
+    <a:masterClrMapping/>
+  </p:clrMapOvr>
+</p:sld>
+</file>
+
+<file path=ppt/slides/slide2.xml><?xml version="1.0" encoding="utf-8"?>
+<p:sld xmlns:a="http://schemas.openxmlformats.org/drawingml/2006/main" xmlns:r="http://schemas.openxmlformats.org/officeDocument/2006/relationships" xmlns:p="http://schemas.openxmlformats.org/presentationml/2006/main">
+  <p:cSld>
+    <p:spTree>
+      <p:nvGrpSpPr>
+        <p:cNvPr id="1" name=""/>
+        <p:cNvGrpSpPr/>
+        <p:nvPr/>
+      </p:nvGrpSpPr>
+      <p:grpSpPr>
+        <a:xfrm>
+          <a:off x="0" y="0"/>
+          <a:ext cx="0" cy="0"/>
+          <a:chOff x="0" y="0"/>
+          <a:chExt cx="0" cy="0"/>
+        </a:xfrm>
+      </p:grpSpPr>
+      <p:sp>
+        <p:nvSpPr>
+          <p:cNvPr id="2" name="TextBox 1">
+            <a:extLst>
+              <a:ext uri="{FF2B5EF4-FFF2-40B4-BE49-F238E27FC236}">
+                <a16:creationId xmlns:a16="http://schemas.microsoft.com/office/drawing/2014/main" id="{635DAA7A-745C-46CE-9578-642F588D8CF3}"/>
+              </a:ext>
+            </a:extLst>
+          </p:cNvPr>
+          <p:cNvSpPr txBox="1"/>
+          <p:nvPr/>
+        </p:nvSpPr>
+        <p:spPr>
+          <a:xfrm>
+            <a:off x="577516" y="1648053"/>
+            <a:ext cx="591829" cy="369332"/>
+          </a:xfrm>
+          <a:prstGeom prst="rect">
+            <a:avLst/>
+          </a:prstGeom>
+          <a:noFill/>
+        </p:spPr>
+        <p:txBody>
+          <a:bodyPr wrap="none" rtlCol="0">
+            <a:spAutoFit/>
+          </a:bodyPr>
+          <a:lstStyle/>
+          <a:p>
+            <a:r>
+              <a:rPr lang="en-US" dirty="0"/>
+              <a:t>user</a:t>
+            </a:r>
+          </a:p>
+        </p:txBody>
+      </p:sp>
+      <p:sp>
+        <p:nvSpPr>
+          <p:cNvPr id="3" name="Rectangle 2">
+            <a:extLst>
+              <a:ext uri="{FF2B5EF4-FFF2-40B4-BE49-F238E27FC236}">
+                <a16:creationId xmlns:a16="http://schemas.microsoft.com/office/drawing/2014/main" id="{EBB1F9F9-C523-4145-B7C5-76C852908335}"/>
+              </a:ext>
+            </a:extLst>
+          </p:cNvPr>
+          <p:cNvSpPr/>
+          <p:nvPr/>
+        </p:nvSpPr>
+        <p:spPr>
+          <a:xfrm>
+            <a:off x="2146434" y="2079056"/>
+            <a:ext cx="2040555" cy="895149"/>
+          </a:xfrm>
+          <a:prstGeom prst="rect">
+            <a:avLst/>
+          </a:prstGeom>
+        </p:spPr>
+        <p:style>
+          <a:lnRef idx="2">
+            <a:schemeClr val="accent1">
+              <a:shade val="50000"/>
+            </a:schemeClr>
+          </a:lnRef>
+          <a:fillRef idx="1">
+            <a:schemeClr val="accent1"/>
+          </a:fillRef>
+          <a:effectRef idx="0">
+            <a:schemeClr val="accent1"/>
+          </a:effectRef>
+          <a:fontRef idx="minor">
+            <a:schemeClr val="lt1"/>
+          </a:fontRef>
+        </p:style>
+        <p:txBody>
+          <a:bodyPr rtlCol="0" anchor="ctr"/>
+          <a:lstStyle/>
+          <a:p>
+            <a:pPr algn="ctr"/>
+            <a:r>
+              <a:rPr lang="en-US" dirty="0"/>
+              <a:t>User input</a:t>
+            </a:r>
+          </a:p>
+        </p:txBody>
+      </p:sp>
+      <p:sp>
+        <p:nvSpPr>
+          <p:cNvPr id="4" name="Rectangle 3">
+            <a:extLst>
+              <a:ext uri="{FF2B5EF4-FFF2-40B4-BE49-F238E27FC236}">
+                <a16:creationId xmlns:a16="http://schemas.microsoft.com/office/drawing/2014/main" id="{5376EA71-4406-4F5B-8F74-3DBAE53C9F00}"/>
+              </a:ext>
+            </a:extLst>
+          </p:cNvPr>
+          <p:cNvSpPr/>
+          <p:nvPr/>
+        </p:nvSpPr>
+        <p:spPr>
+          <a:xfrm>
+            <a:off x="2146434" y="105879"/>
+            <a:ext cx="1992429" cy="1437736"/>
+          </a:xfrm>
+          <a:prstGeom prst="rect">
+            <a:avLst/>
+          </a:prstGeom>
+        </p:spPr>
+        <p:style>
+          <a:lnRef idx="2">
+            <a:schemeClr val="accent1">
+              <a:shade val="50000"/>
+            </a:schemeClr>
+          </a:lnRef>
+          <a:fillRef idx="1">
+            <a:schemeClr val="accent1"/>
+          </a:fillRef>
+          <a:effectRef idx="0">
+            <a:schemeClr val="accent1"/>
+          </a:effectRef>
+          <a:fontRef idx="minor">
+            <a:schemeClr val="lt1"/>
+          </a:fontRef>
+        </p:style>
+        <p:txBody>
+          <a:bodyPr rtlCol="0" anchor="ctr"/>
+          <a:lstStyle/>
+          <a:p>
+            <a:pPr algn="ctr"/>
+            <a:r>
+              <a:rPr lang="en-US" dirty="0"/>
+              <a:t>Result:</a:t>
+            </a:r>
+          </a:p>
+          <a:p>
+            <a:pPr algn="ctr"/>
+            <a:r>
+              <a:rPr lang="en-US" dirty="0"/>
+              <a:t>Positive( level of diagnosis) or negative</a:t>
+            </a:r>
+          </a:p>
+        </p:txBody>
+      </p:sp>
+      <p:cxnSp>
+        <p:nvCxnSpPr>
+          <p:cNvPr id="6" name="Straight Arrow Connector 5">
+            <a:extLst>
+              <a:ext uri="{FF2B5EF4-FFF2-40B4-BE49-F238E27FC236}">
+                <a16:creationId xmlns:a16="http://schemas.microsoft.com/office/drawing/2014/main" id="{38501A34-1C14-4946-9ED1-A0B0B14FF105}"/>
+              </a:ext>
+            </a:extLst>
+          </p:cNvPr>
+          <p:cNvCxnSpPr>
+            <a:cxnSpLocks/>
+            <a:stCxn id="2" idx="0"/>
+            <a:endCxn id="4" idx="1"/>
+          </p:cNvCxnSpPr>
+          <p:nvPr/>
+        </p:nvCxnSpPr>
+        <p:spPr>
+          <a:xfrm flipV="1">
+            <a:off x="873431" y="824747"/>
+            <a:ext cx="1273003" cy="823306"/>
+          </a:xfrm>
+          <a:prstGeom prst="straightConnector1">
+            <a:avLst/>
+          </a:prstGeom>
+          <a:ln>
+            <a:tailEnd type="triangle"/>
+          </a:ln>
+        </p:spPr>
+        <p:style>
+          <a:lnRef idx="1">
+            <a:schemeClr val="accent1"/>
+          </a:lnRef>
+          <a:fillRef idx="0">
+            <a:schemeClr val="accent1"/>
+          </a:fillRef>
+          <a:effectRef idx="0">
+            <a:schemeClr val="accent1"/>
+          </a:effectRef>
+          <a:fontRef idx="minor">
+            <a:schemeClr val="tx1"/>
+          </a:fontRef>
+        </p:style>
+      </p:cxnSp>
+      <p:cxnSp>
+        <p:nvCxnSpPr>
+          <p:cNvPr id="8" name="Straight Arrow Connector 7">
+            <a:extLst>
+              <a:ext uri="{FF2B5EF4-FFF2-40B4-BE49-F238E27FC236}">
+                <a16:creationId xmlns:a16="http://schemas.microsoft.com/office/drawing/2014/main" id="{C5E353A6-77F0-4CC7-8231-A89157DF2EE2}"/>
+              </a:ext>
+            </a:extLst>
+          </p:cNvPr>
+          <p:cNvCxnSpPr>
+            <a:cxnSpLocks/>
+            <a:stCxn id="2" idx="2"/>
+            <a:endCxn id="3" idx="1"/>
+          </p:cNvCxnSpPr>
+          <p:nvPr/>
+        </p:nvCxnSpPr>
+        <p:spPr>
+          <a:xfrm>
+            <a:off x="873431" y="2017385"/>
+            <a:ext cx="1273003" cy="509246"/>
+          </a:xfrm>
+          <a:prstGeom prst="straightConnector1">
+            <a:avLst/>
+          </a:prstGeom>
+          <a:ln>
+            <a:tailEnd type="triangle"/>
+          </a:ln>
+        </p:spPr>
+        <p:style>
+          <a:lnRef idx="1">
+            <a:schemeClr val="accent1"/>
+          </a:lnRef>
+          <a:fillRef idx="0">
+            <a:schemeClr val="accent1"/>
+          </a:fillRef>
+          <a:effectRef idx="0">
+            <a:schemeClr val="accent1"/>
+          </a:effectRef>
+          <a:fontRef idx="minor">
+            <a:schemeClr val="tx1"/>
+          </a:fontRef>
+        </p:style>
+      </p:cxnSp>
+      <p:sp>
+        <p:nvSpPr>
+          <p:cNvPr id="15" name="Rectangle 14">
+            <a:extLst>
+              <a:ext uri="{FF2B5EF4-FFF2-40B4-BE49-F238E27FC236}">
+                <a16:creationId xmlns:a16="http://schemas.microsoft.com/office/drawing/2014/main" id="{D4D6178E-C3D8-4E28-8A27-E05ACF8C901E}"/>
+              </a:ext>
+            </a:extLst>
+          </p:cNvPr>
+          <p:cNvSpPr/>
+          <p:nvPr/>
+        </p:nvSpPr>
+        <p:spPr>
+          <a:xfrm>
+            <a:off x="5168767" y="418973"/>
+            <a:ext cx="1838426" cy="811548"/>
+          </a:xfrm>
+          <a:prstGeom prst="rect">
+            <a:avLst/>
+          </a:prstGeom>
+        </p:spPr>
+        <p:style>
+          <a:lnRef idx="2">
+            <a:schemeClr val="accent1">
+              <a:shade val="50000"/>
+            </a:schemeClr>
+          </a:lnRef>
+          <a:fillRef idx="1">
+            <a:schemeClr val="accent1"/>
+          </a:fillRef>
+          <a:effectRef idx="0">
+            <a:schemeClr val="accent1"/>
+          </a:effectRef>
+          <a:fontRef idx="minor">
+            <a:schemeClr val="lt1"/>
+          </a:fontRef>
+        </p:style>
+        <p:txBody>
+          <a:bodyPr rtlCol="0" anchor="ctr"/>
+          <a:lstStyle/>
+          <a:p>
+            <a:pPr algn="ctr"/>
+            <a:r>
+              <a:rPr lang="en-US" dirty="0"/>
+              <a:t>Trained classifier</a:t>
+            </a:r>
+          </a:p>
+        </p:txBody>
+      </p:sp>
+      <p:cxnSp>
+        <p:nvCxnSpPr>
+          <p:cNvPr id="17" name="Connector: Elbow 16">
+            <a:extLst>
+              <a:ext uri="{FF2B5EF4-FFF2-40B4-BE49-F238E27FC236}">
+                <a16:creationId xmlns:a16="http://schemas.microsoft.com/office/drawing/2014/main" id="{05514A6C-A581-410D-8980-F6A8A4898D04}"/>
+              </a:ext>
+            </a:extLst>
+          </p:cNvPr>
+          <p:cNvCxnSpPr>
+            <a:cxnSpLocks/>
+            <a:stCxn id="3" idx="3"/>
+            <a:endCxn id="15" idx="2"/>
+          </p:cNvCxnSpPr>
+          <p:nvPr/>
+        </p:nvCxnSpPr>
+        <p:spPr>
+          <a:xfrm flipV="1">
+            <a:off x="4186989" y="1230521"/>
+            <a:ext cx="1900991" cy="1296110"/>
+          </a:xfrm>
+          <a:prstGeom prst="bentConnector2">
+            <a:avLst/>
+          </a:prstGeom>
+          <a:ln>
+            <a:tailEnd type="triangle"/>
+          </a:ln>
+        </p:spPr>
+        <p:style>
+          <a:lnRef idx="1">
+            <a:schemeClr val="accent1"/>
+          </a:lnRef>
+          <a:fillRef idx="0">
+            <a:schemeClr val="accent1"/>
+          </a:fillRef>
+          <a:effectRef idx="0">
+            <a:schemeClr val="accent1"/>
+          </a:effectRef>
+          <a:fontRef idx="minor">
+            <a:schemeClr val="tx1"/>
+          </a:fontRef>
+        </p:style>
+      </p:cxnSp>
+      <p:cxnSp>
+        <p:nvCxnSpPr>
+          <p:cNvPr id="19" name="Straight Arrow Connector 18">
+            <a:extLst>
+              <a:ext uri="{FF2B5EF4-FFF2-40B4-BE49-F238E27FC236}">
+                <a16:creationId xmlns:a16="http://schemas.microsoft.com/office/drawing/2014/main" id="{1016ED6D-CC80-4390-9D04-2E0D76AA8226}"/>
+              </a:ext>
+            </a:extLst>
+          </p:cNvPr>
+          <p:cNvCxnSpPr>
+            <a:cxnSpLocks/>
+            <a:stCxn id="15" idx="1"/>
+            <a:endCxn id="4" idx="3"/>
+          </p:cNvCxnSpPr>
+          <p:nvPr/>
+        </p:nvCxnSpPr>
+        <p:spPr>
+          <a:xfrm flipH="1">
+            <a:off x="4138863" y="824747"/>
+            <a:ext cx="1029904" cy="0"/>
+          </a:xfrm>
+          <a:prstGeom prst="straightConnector1">
+            <a:avLst/>
+          </a:prstGeom>
+          <a:ln>
+            <a:tailEnd type="triangle"/>
+          </a:ln>
+        </p:spPr>
+        <p:style>
+          <a:lnRef idx="1">
+            <a:schemeClr val="accent1"/>
+          </a:lnRef>
+          <a:fillRef idx="0">
+            <a:schemeClr val="accent1"/>
+          </a:fillRef>
+          <a:effectRef idx="0">
+            <a:schemeClr val="accent1"/>
+          </a:effectRef>
+          <a:fontRef idx="minor">
+            <a:schemeClr val="tx1"/>
+          </a:fontRef>
+        </p:style>
+      </p:cxnSp>
+      <p:sp>
+        <p:nvSpPr>
+          <p:cNvPr id="24" name="Flowchart: Magnetic Disk 23">
+            <a:extLst>
+              <a:ext uri="{FF2B5EF4-FFF2-40B4-BE49-F238E27FC236}">
+                <a16:creationId xmlns:a16="http://schemas.microsoft.com/office/drawing/2014/main" id="{B6AE9E93-4C6F-48E6-AA07-3DA228645F50}"/>
+              </a:ext>
+            </a:extLst>
+          </p:cNvPr>
+          <p:cNvSpPr/>
+          <p:nvPr/>
+        </p:nvSpPr>
+        <p:spPr>
+          <a:xfrm>
+            <a:off x="6287101" y="3018620"/>
+            <a:ext cx="2223436" cy="1771048"/>
+          </a:xfrm>
+          <a:prstGeom prst="flowChartMagneticDisk">
+            <a:avLst/>
+          </a:prstGeom>
+        </p:spPr>
+        <p:style>
+          <a:lnRef idx="2">
+            <a:schemeClr val="accent1">
+              <a:shade val="50000"/>
+            </a:schemeClr>
+          </a:lnRef>
+          <a:fillRef idx="1">
+            <a:schemeClr val="accent1"/>
+          </a:fillRef>
+          <a:effectRef idx="0">
+            <a:schemeClr val="accent1"/>
+          </a:effectRef>
+          <a:fontRef idx="minor">
+            <a:schemeClr val="lt1"/>
+          </a:fontRef>
+        </p:style>
+        <p:txBody>
+          <a:bodyPr rtlCol="0" anchor="ctr"/>
+          <a:lstStyle/>
+          <a:p>
+            <a:pPr algn="ctr"/>
+            <a:r>
+              <a:rPr lang="en-US" dirty="0"/>
+              <a:t>Data storage</a:t>
+            </a:r>
+          </a:p>
+        </p:txBody>
+      </p:sp>
+      <p:sp>
+        <p:nvSpPr>
+          <p:cNvPr id="32" name="Rectangle 31">
+            <a:extLst>
+              <a:ext uri="{FF2B5EF4-FFF2-40B4-BE49-F238E27FC236}">
+                <a16:creationId xmlns:a16="http://schemas.microsoft.com/office/drawing/2014/main" id="{4DC6569E-0326-4FA0-9AB8-1B2DABB143F0}"/>
+              </a:ext>
+            </a:extLst>
+          </p:cNvPr>
+          <p:cNvSpPr/>
+          <p:nvPr/>
+        </p:nvSpPr>
+        <p:spPr>
+          <a:xfrm>
+            <a:off x="9589167" y="275420"/>
+            <a:ext cx="1934678" cy="808522"/>
+          </a:xfrm>
+          <a:prstGeom prst="rect">
+            <a:avLst/>
+          </a:prstGeom>
+        </p:spPr>
+        <p:style>
+          <a:lnRef idx="2">
+            <a:schemeClr val="accent1">
+              <a:shade val="50000"/>
+            </a:schemeClr>
+          </a:lnRef>
+          <a:fillRef idx="1">
+            <a:schemeClr val="accent1"/>
+          </a:fillRef>
+          <a:effectRef idx="0">
+            <a:schemeClr val="accent1"/>
+          </a:effectRef>
+          <a:fontRef idx="minor">
+            <a:schemeClr val="lt1"/>
+          </a:fontRef>
+        </p:style>
+        <p:txBody>
+          <a:bodyPr rtlCol="0" anchor="ctr"/>
+          <a:lstStyle/>
+          <a:p>
+            <a:pPr algn="ctr"/>
+            <a:r>
+              <a:rPr lang="en-US" dirty="0"/>
+              <a:t>Sample data</a:t>
+            </a:r>
+          </a:p>
+        </p:txBody>
+      </p:sp>
+      <p:sp>
+        <p:nvSpPr>
+          <p:cNvPr id="34" name="Rectangle 33">
+            <a:extLst>
+              <a:ext uri="{FF2B5EF4-FFF2-40B4-BE49-F238E27FC236}">
+                <a16:creationId xmlns:a16="http://schemas.microsoft.com/office/drawing/2014/main" id="{CB0A1A25-8CCF-42F3-805B-081FCA74BEBB}"/>
+              </a:ext>
+            </a:extLst>
+          </p:cNvPr>
+          <p:cNvSpPr/>
+          <p:nvPr/>
+        </p:nvSpPr>
+        <p:spPr>
+          <a:xfrm>
+            <a:off x="9622256" y="1867747"/>
+            <a:ext cx="1934678" cy="808522"/>
+          </a:xfrm>
+          <a:prstGeom prst="rect">
+            <a:avLst/>
+          </a:prstGeom>
+        </p:spPr>
+        <p:style>
+          <a:lnRef idx="2">
+            <a:schemeClr val="accent1">
+              <a:shade val="50000"/>
+            </a:schemeClr>
+          </a:lnRef>
+          <a:fillRef idx="1">
+            <a:schemeClr val="accent1"/>
+          </a:fillRef>
+          <a:effectRef idx="0">
+            <a:schemeClr val="accent1"/>
+          </a:effectRef>
+          <a:fontRef idx="minor">
+            <a:schemeClr val="lt1"/>
+          </a:fontRef>
+        </p:style>
+        <p:txBody>
+          <a:bodyPr rtlCol="0" anchor="ctr"/>
+          <a:lstStyle/>
+          <a:p>
+            <a:pPr algn="ctr"/>
+            <a:r>
+              <a:rPr lang="en-US" dirty="0"/>
+              <a:t>Test data</a:t>
+            </a:r>
+          </a:p>
+        </p:txBody>
+      </p:sp>
+      <p:sp>
+        <p:nvSpPr>
+          <p:cNvPr id="44" name="Rectangle 43">
+            <a:extLst>
+              <a:ext uri="{FF2B5EF4-FFF2-40B4-BE49-F238E27FC236}">
+                <a16:creationId xmlns:a16="http://schemas.microsoft.com/office/drawing/2014/main" id="{9C6BB6AB-81D6-4D54-88DE-977D9FB0FBF3}"/>
+              </a:ext>
+            </a:extLst>
+          </p:cNvPr>
+          <p:cNvSpPr/>
+          <p:nvPr/>
+        </p:nvSpPr>
+        <p:spPr>
+          <a:xfrm>
+            <a:off x="9656544" y="3461382"/>
+            <a:ext cx="1799924" cy="885525"/>
+          </a:xfrm>
+          <a:prstGeom prst="rect">
+            <a:avLst/>
+          </a:prstGeom>
+        </p:spPr>
+        <p:style>
+          <a:lnRef idx="2">
+            <a:schemeClr val="accent1">
+              <a:shade val="50000"/>
+            </a:schemeClr>
+          </a:lnRef>
+          <a:fillRef idx="1">
+            <a:schemeClr val="accent1"/>
+          </a:fillRef>
+          <a:effectRef idx="0">
+            <a:schemeClr val="accent1"/>
+          </a:effectRef>
+          <a:fontRef idx="minor">
+            <a:schemeClr val="lt1"/>
+          </a:fontRef>
+        </p:style>
+        <p:txBody>
+          <a:bodyPr rtlCol="0" anchor="ctr"/>
+          <a:lstStyle/>
+          <a:p>
+            <a:pPr algn="ctr"/>
+            <a:r>
+              <a:rPr lang="en-US" dirty="0"/>
+              <a:t>Training </a:t>
+            </a:r>
+            <a:r>
+              <a:rPr lang="en-US" dirty="0" err="1"/>
+              <a:t>clasifier</a:t>
+            </a:r>
+            <a:endParaRPr lang="en-US" dirty="0"/>
+          </a:p>
+        </p:txBody>
+      </p:sp>
+      <p:sp>
+        <p:nvSpPr>
+          <p:cNvPr id="45" name="Rectangle 44">
+            <a:extLst>
+              <a:ext uri="{FF2B5EF4-FFF2-40B4-BE49-F238E27FC236}">
+                <a16:creationId xmlns:a16="http://schemas.microsoft.com/office/drawing/2014/main" id="{B7280F76-5D01-4CC8-B580-9B8BCB0E1EBF}"/>
+              </a:ext>
+            </a:extLst>
+          </p:cNvPr>
+          <p:cNvSpPr/>
+          <p:nvPr/>
+        </p:nvSpPr>
+        <p:spPr>
+          <a:xfrm>
+            <a:off x="9656544" y="5313145"/>
+            <a:ext cx="1799924" cy="885525"/>
+          </a:xfrm>
+          <a:prstGeom prst="rect">
+            <a:avLst/>
+          </a:prstGeom>
+        </p:spPr>
+        <p:style>
+          <a:lnRef idx="2">
+            <a:schemeClr val="accent1">
+              <a:shade val="50000"/>
+            </a:schemeClr>
+          </a:lnRef>
+          <a:fillRef idx="1">
+            <a:schemeClr val="accent1"/>
+          </a:fillRef>
+          <a:effectRef idx="0">
+            <a:schemeClr val="accent1"/>
+          </a:effectRef>
+          <a:fontRef idx="minor">
+            <a:schemeClr val="lt1"/>
+          </a:fontRef>
+        </p:style>
+        <p:txBody>
+          <a:bodyPr rtlCol="0" anchor="ctr"/>
+          <a:lstStyle/>
+          <a:p>
+            <a:pPr algn="ctr"/>
+            <a:r>
+              <a:rPr lang="en-US" dirty="0"/>
+              <a:t>Storing trained classifier</a:t>
+            </a:r>
+          </a:p>
+        </p:txBody>
+      </p:sp>
+      <p:cxnSp>
+        <p:nvCxnSpPr>
+          <p:cNvPr id="47" name="Straight Arrow Connector 46">
+            <a:extLst>
+              <a:ext uri="{FF2B5EF4-FFF2-40B4-BE49-F238E27FC236}">
+                <a16:creationId xmlns:a16="http://schemas.microsoft.com/office/drawing/2014/main" id="{EC039648-94BD-4B16-92BC-09FCCA407469}"/>
+              </a:ext>
+            </a:extLst>
+          </p:cNvPr>
+          <p:cNvCxnSpPr>
+            <a:stCxn id="24" idx="4"/>
+            <a:endCxn id="44" idx="1"/>
+          </p:cNvCxnSpPr>
+          <p:nvPr/>
+        </p:nvCxnSpPr>
+        <p:spPr>
+          <a:xfrm>
+            <a:off x="8510537" y="3904144"/>
+            <a:ext cx="1146007" cy="1"/>
+          </a:xfrm>
+          <a:prstGeom prst="straightConnector1">
+            <a:avLst/>
+          </a:prstGeom>
+          <a:ln>
+            <a:tailEnd type="triangle"/>
+          </a:ln>
+        </p:spPr>
+        <p:style>
+          <a:lnRef idx="1">
+            <a:schemeClr val="accent1"/>
+          </a:lnRef>
+          <a:fillRef idx="0">
+            <a:schemeClr val="accent1"/>
+          </a:fillRef>
+          <a:effectRef idx="0">
+            <a:schemeClr val="accent1"/>
+          </a:effectRef>
+          <a:fontRef idx="minor">
+            <a:schemeClr val="tx1"/>
+          </a:fontRef>
+        </p:style>
+      </p:cxnSp>
+      <p:cxnSp>
+        <p:nvCxnSpPr>
+          <p:cNvPr id="49" name="Straight Arrow Connector 48">
+            <a:extLst>
+              <a:ext uri="{FF2B5EF4-FFF2-40B4-BE49-F238E27FC236}">
+                <a16:creationId xmlns:a16="http://schemas.microsoft.com/office/drawing/2014/main" id="{D1CF69D5-3F01-41CE-97FC-334B62FC64B7}"/>
+              </a:ext>
+            </a:extLst>
+          </p:cNvPr>
+          <p:cNvCxnSpPr>
+            <a:stCxn id="44" idx="2"/>
+            <a:endCxn id="45" idx="0"/>
+          </p:cNvCxnSpPr>
+          <p:nvPr/>
+        </p:nvCxnSpPr>
+        <p:spPr>
+          <a:xfrm>
+            <a:off x="10556506" y="4346907"/>
+            <a:ext cx="0" cy="966238"/>
+          </a:xfrm>
+          <a:prstGeom prst="straightConnector1">
+            <a:avLst/>
+          </a:prstGeom>
+          <a:ln>
+            <a:tailEnd type="triangle"/>
+          </a:ln>
+        </p:spPr>
+        <p:style>
+          <a:lnRef idx="1">
+            <a:schemeClr val="accent1"/>
+          </a:lnRef>
+          <a:fillRef idx="0">
+            <a:schemeClr val="accent1"/>
+          </a:fillRef>
+          <a:effectRef idx="0">
+            <a:schemeClr val="accent1"/>
+          </a:effectRef>
+          <a:fontRef idx="minor">
+            <a:schemeClr val="tx1"/>
+          </a:fontRef>
+        </p:style>
+      </p:cxnSp>
+      <p:cxnSp>
+        <p:nvCxnSpPr>
+          <p:cNvPr id="51" name="Connector: Elbow 50">
+            <a:extLst>
+              <a:ext uri="{FF2B5EF4-FFF2-40B4-BE49-F238E27FC236}">
+                <a16:creationId xmlns:a16="http://schemas.microsoft.com/office/drawing/2014/main" id="{CA495E7B-2883-4830-A368-93AA0297AB7A}"/>
+              </a:ext>
+            </a:extLst>
+          </p:cNvPr>
+          <p:cNvCxnSpPr>
+            <a:stCxn id="45" idx="1"/>
+            <a:endCxn id="24" idx="3"/>
+          </p:cNvCxnSpPr>
+          <p:nvPr/>
+        </p:nvCxnSpPr>
+        <p:spPr>
+          <a:xfrm rot="10800000">
+            <a:off x="7398820" y="4789668"/>
+            <a:ext cx="2257725" cy="966240"/>
+          </a:xfrm>
+          <a:prstGeom prst="bentConnector2">
+            <a:avLst/>
+          </a:prstGeom>
+          <a:ln>
+            <a:tailEnd type="triangle"/>
+          </a:ln>
+        </p:spPr>
+        <p:style>
+          <a:lnRef idx="1">
+            <a:schemeClr val="accent1"/>
+          </a:lnRef>
+          <a:fillRef idx="0">
+            <a:schemeClr val="accent1"/>
+          </a:fillRef>
+          <a:effectRef idx="0">
+            <a:schemeClr val="accent1"/>
+          </a:effectRef>
+          <a:fontRef idx="minor">
+            <a:schemeClr val="tx1"/>
+          </a:fontRef>
+        </p:style>
+      </p:cxnSp>
+      <p:cxnSp>
+        <p:nvCxnSpPr>
+          <p:cNvPr id="53" name="Connector: Elbow 52">
+            <a:extLst>
+              <a:ext uri="{FF2B5EF4-FFF2-40B4-BE49-F238E27FC236}">
+                <a16:creationId xmlns:a16="http://schemas.microsoft.com/office/drawing/2014/main" id="{A9C19C51-1CDE-4649-9CBA-0D2DD71CE89E}"/>
+              </a:ext>
+            </a:extLst>
+          </p:cNvPr>
+          <p:cNvCxnSpPr>
+            <a:cxnSpLocks/>
+            <a:stCxn id="24" idx="1"/>
+            <a:endCxn id="15" idx="3"/>
+          </p:cNvCxnSpPr>
+          <p:nvPr/>
+        </p:nvCxnSpPr>
+        <p:spPr>
+          <a:xfrm rot="16200000" flipV="1">
+            <a:off x="6106070" y="1725871"/>
+            <a:ext cx="2193873" cy="391626"/>
+          </a:xfrm>
+          <a:prstGeom prst="bentConnector2">
+            <a:avLst/>
+          </a:prstGeom>
+          <a:ln>
+            <a:tailEnd type="triangle"/>
+          </a:ln>
+        </p:spPr>
+        <p:style>
+          <a:lnRef idx="1">
+            <a:schemeClr val="accent1"/>
+          </a:lnRef>
+          <a:fillRef idx="0">
+            <a:schemeClr val="accent1"/>
+          </a:fillRef>
+          <a:effectRef idx="0">
+            <a:schemeClr val="accent1"/>
+          </a:effectRef>
+          <a:fontRef idx="minor">
+            <a:schemeClr val="tx1"/>
+          </a:fontRef>
+        </p:style>
+      </p:cxnSp>
+      <p:cxnSp>
+        <p:nvCxnSpPr>
+          <p:cNvPr id="79" name="Connector: Elbow 78">
+            <a:extLst>
+              <a:ext uri="{FF2B5EF4-FFF2-40B4-BE49-F238E27FC236}">
+                <a16:creationId xmlns:a16="http://schemas.microsoft.com/office/drawing/2014/main" id="{BE49855E-D09B-4ED0-B2D6-3CF11191D0C1}"/>
+              </a:ext>
+            </a:extLst>
+          </p:cNvPr>
+          <p:cNvCxnSpPr>
+            <a:stCxn id="3" idx="2"/>
+            <a:endCxn id="24" idx="2"/>
+          </p:cNvCxnSpPr>
+          <p:nvPr/>
+        </p:nvCxnSpPr>
+        <p:spPr>
+          <a:xfrm rot="16200000" flipH="1">
+            <a:off x="4261937" y="1878979"/>
+            <a:ext cx="929939" cy="3120389"/>
+          </a:xfrm>
+          <a:prstGeom prst="bentConnector2">
+            <a:avLst/>
+          </a:prstGeom>
+          <a:ln>
+            <a:tailEnd type="triangle"/>
+          </a:ln>
+        </p:spPr>
+        <p:style>
+          <a:lnRef idx="1">
+            <a:schemeClr val="accent1"/>
+          </a:lnRef>
+          <a:fillRef idx="0">
+            <a:schemeClr val="accent1"/>
+          </a:fillRef>
+          <a:effectRef idx="0">
+            <a:schemeClr val="accent1"/>
+          </a:effectRef>
+          <a:fontRef idx="minor">
+            <a:schemeClr val="tx1"/>
+          </a:fontRef>
+        </p:style>
+      </p:cxnSp>
+      <p:cxnSp>
+        <p:nvCxnSpPr>
+          <p:cNvPr id="114" name="Straight Arrow Connector 113">
+            <a:extLst>
+              <a:ext uri="{FF2B5EF4-FFF2-40B4-BE49-F238E27FC236}">
+                <a16:creationId xmlns:a16="http://schemas.microsoft.com/office/drawing/2014/main" id="{2BB76BD8-B565-4F4D-BBB7-B30894A19967}"/>
+              </a:ext>
+            </a:extLst>
+          </p:cNvPr>
+          <p:cNvCxnSpPr>
+            <a:stCxn id="32" idx="1"/>
+            <a:endCxn id="24" idx="4"/>
+          </p:cNvCxnSpPr>
+          <p:nvPr/>
+        </p:nvCxnSpPr>
+        <p:spPr>
+          <a:xfrm flipH="1">
+            <a:off x="8510537" y="679681"/>
+            <a:ext cx="1078630" cy="3224463"/>
+          </a:xfrm>
+          <a:prstGeom prst="straightConnector1">
+            <a:avLst/>
+          </a:prstGeom>
+          <a:ln>
+            <a:tailEnd type="triangle"/>
+          </a:ln>
+        </p:spPr>
+        <p:style>
+          <a:lnRef idx="1">
+            <a:schemeClr val="accent1"/>
+          </a:lnRef>
+          <a:fillRef idx="0">
+            <a:schemeClr val="accent1"/>
+          </a:fillRef>
+          <a:effectRef idx="0">
+            <a:schemeClr val="accent1"/>
+          </a:effectRef>
+          <a:fontRef idx="minor">
+            <a:schemeClr val="tx1"/>
+          </a:fontRef>
+        </p:style>
+      </p:cxnSp>
+      <p:cxnSp>
+        <p:nvCxnSpPr>
+          <p:cNvPr id="116" name="Straight Arrow Connector 115">
+            <a:extLst>
+              <a:ext uri="{FF2B5EF4-FFF2-40B4-BE49-F238E27FC236}">
+                <a16:creationId xmlns:a16="http://schemas.microsoft.com/office/drawing/2014/main" id="{A2E05BCE-13D2-4C1A-A102-54C015EEFB11}"/>
+              </a:ext>
+            </a:extLst>
+          </p:cNvPr>
+          <p:cNvCxnSpPr>
+            <a:stCxn id="34" idx="1"/>
+            <a:endCxn id="24" idx="4"/>
+          </p:cNvCxnSpPr>
+          <p:nvPr/>
+        </p:nvCxnSpPr>
+        <p:spPr>
+          <a:xfrm flipH="1">
+            <a:off x="8510537" y="2272008"/>
+            <a:ext cx="1111719" cy="1632136"/>
+          </a:xfrm>
+          <a:prstGeom prst="straightConnector1">
+            <a:avLst/>
+          </a:prstGeom>
+          <a:ln>
+            <a:tailEnd type="triangle"/>
+          </a:ln>
+        </p:spPr>
+        <p:style>
+          <a:lnRef idx="1">
+            <a:schemeClr val="accent1"/>
+          </a:lnRef>
+          <a:fillRef idx="0">
+            <a:schemeClr val="accent1"/>
+          </a:fillRef>
+          <a:effectRef idx="0">
+            <a:schemeClr val="accent1"/>
+          </a:effectRef>
+          <a:fontRef idx="minor">
+            <a:schemeClr val="tx1"/>
+          </a:fontRef>
+        </p:style>
+      </p:cxnSp>
+    </p:spTree>
+    <p:extLst>
+      <p:ext uri="{BB962C8B-B14F-4D97-AF65-F5344CB8AC3E}">
+        <p14:creationId xmlns:p14="http://schemas.microsoft.com/office/powerpoint/2010/main" val="2517998535"/>
+      </p:ext>
+    </p:extLst>
+  </p:cSld>
+  <p:clrMapOvr>
+    <a:masterClrMapping/>
+  </p:clrMapOvr>
+</p:sld>
+</file>
+
+<file path=ppt/slides/slide3.xml><?xml version="1.0" encoding="utf-8"?>
+<p:sld xmlns:a="http://schemas.openxmlformats.org/drawingml/2006/main" xmlns:r="http://schemas.openxmlformats.org/officeDocument/2006/relationships" xmlns:p="http://schemas.openxmlformats.org/presentationml/2006/main">
+  <p:cSld>
+    <p:spTree>
+      <p:nvGrpSpPr>
+        <p:cNvPr id="1" name=""/>
+        <p:cNvGrpSpPr/>
+        <p:nvPr/>
+      </p:nvGrpSpPr>
+      <p:grpSpPr>
+        <a:xfrm>
+          <a:off x="0" y="0"/>
+          <a:ext cx="0" cy="0"/>
+          <a:chOff x="0" y="0"/>
+          <a:chExt cx="0" cy="0"/>
+        </a:xfrm>
+      </p:grpSpPr>
+      <p:sp>
+        <p:nvSpPr>
+          <p:cNvPr id="28" name="Rectangle 27">
+            <a:extLst>
+              <a:ext uri="{FF2B5EF4-FFF2-40B4-BE49-F238E27FC236}">
+                <a16:creationId xmlns:a16="http://schemas.microsoft.com/office/drawing/2014/main" id="{EA6D6E35-E08A-4F2D-8E5E-D3DB8A322F30}"/>
+              </a:ext>
+            </a:extLst>
+          </p:cNvPr>
+          <p:cNvSpPr/>
+          <p:nvPr/>
+        </p:nvSpPr>
+        <p:spPr>
+          <a:xfrm>
+            <a:off x="4089132" y="128139"/>
+            <a:ext cx="1106906" cy="721894"/>
+          </a:xfrm>
+          <a:prstGeom prst="rect">
+            <a:avLst/>
+          </a:prstGeom>
+        </p:spPr>
+        <p:style>
+          <a:lnRef idx="2">
+            <a:schemeClr val="accent1">
+              <a:shade val="50000"/>
+            </a:schemeClr>
+          </a:lnRef>
+          <a:fillRef idx="1">
+            <a:schemeClr val="accent1"/>
+          </a:fillRef>
+          <a:effectRef idx="0">
+            <a:schemeClr val="accent1"/>
+          </a:effectRef>
+          <a:fontRef idx="minor">
+            <a:schemeClr val="lt1"/>
+          </a:fontRef>
+        </p:style>
+        <p:txBody>
+          <a:bodyPr rtlCol="0" anchor="ctr"/>
+          <a:lstStyle/>
+          <a:p>
+            <a:pPr algn="ctr"/>
+            <a:r>
+              <a:rPr lang="en-US" dirty="0"/>
+              <a:t>Sample data</a:t>
+            </a:r>
+          </a:p>
+        </p:txBody>
+      </p:sp>
+      <p:sp>
+        <p:nvSpPr>
+          <p:cNvPr id="30" name="Rectangle 29">
+            <a:extLst>
+              <a:ext uri="{FF2B5EF4-FFF2-40B4-BE49-F238E27FC236}">
+                <a16:creationId xmlns:a16="http://schemas.microsoft.com/office/drawing/2014/main" id="{D8083C28-62C3-4DA5-99C5-304C33EC4187}"/>
+              </a:ext>
+            </a:extLst>
+          </p:cNvPr>
+          <p:cNvSpPr/>
+          <p:nvPr/>
+        </p:nvSpPr>
+        <p:spPr>
+          <a:xfrm>
+            <a:off x="4098758" y="1118939"/>
+            <a:ext cx="1106906" cy="721894"/>
+          </a:xfrm>
+          <a:prstGeom prst="rect">
+            <a:avLst/>
+          </a:prstGeom>
+        </p:spPr>
+        <p:style>
+          <a:lnRef idx="2">
+            <a:schemeClr val="accent1">
+              <a:shade val="50000"/>
+            </a:schemeClr>
+          </a:lnRef>
+          <a:fillRef idx="1">
+            <a:schemeClr val="accent1"/>
+          </a:fillRef>
+          <a:effectRef idx="0">
+            <a:schemeClr val="accent1"/>
+          </a:effectRef>
+          <a:fontRef idx="minor">
+            <a:schemeClr val="lt1"/>
+          </a:fontRef>
+        </p:style>
+        <p:txBody>
+          <a:bodyPr rtlCol="0" anchor="ctr"/>
+          <a:lstStyle/>
+          <a:p>
+            <a:pPr algn="ctr"/>
+            <a:r>
+              <a:rPr lang="en-US" dirty="0"/>
+              <a:t>Test</a:t>
+            </a:r>
+          </a:p>
+          <a:p>
+            <a:pPr algn="ctr"/>
+            <a:r>
+              <a:rPr lang="en-US" dirty="0"/>
+              <a:t> data</a:t>
+            </a:r>
+          </a:p>
+        </p:txBody>
+      </p:sp>
+      <p:sp>
+        <p:nvSpPr>
+          <p:cNvPr id="31" name="Rectangle 30">
+            <a:extLst>
+              <a:ext uri="{FF2B5EF4-FFF2-40B4-BE49-F238E27FC236}">
+                <a16:creationId xmlns:a16="http://schemas.microsoft.com/office/drawing/2014/main" id="{E1E5D396-07AF-4A69-93AE-EDC3918E182F}"/>
+              </a:ext>
+            </a:extLst>
+          </p:cNvPr>
+          <p:cNvSpPr/>
+          <p:nvPr/>
+        </p:nvSpPr>
+        <p:spPr>
+          <a:xfrm>
+            <a:off x="616017" y="2204186"/>
+            <a:ext cx="2395087" cy="1145406"/>
+          </a:xfrm>
+          <a:prstGeom prst="rect">
+            <a:avLst/>
+          </a:prstGeom>
+        </p:spPr>
+        <p:style>
+          <a:lnRef idx="2">
+            <a:schemeClr val="accent1">
+              <a:shade val="50000"/>
+            </a:schemeClr>
+          </a:lnRef>
+          <a:fillRef idx="1">
+            <a:schemeClr val="accent1"/>
+          </a:fillRef>
+          <a:effectRef idx="0">
+            <a:schemeClr val="accent1"/>
+          </a:effectRef>
+          <a:fontRef idx="minor">
+            <a:schemeClr val="lt1"/>
+          </a:fontRef>
+        </p:style>
+        <p:txBody>
+          <a:bodyPr rtlCol="0" anchor="ctr"/>
+          <a:lstStyle/>
+          <a:p>
+            <a:pPr algn="ctr"/>
+            <a:r>
+              <a:rPr lang="en-US" dirty="0"/>
+              <a:t>classifier</a:t>
+            </a:r>
+          </a:p>
+        </p:txBody>
+      </p:sp>
+      <p:sp>
+        <p:nvSpPr>
+          <p:cNvPr id="38" name="Rectangle 37">
+            <a:extLst>
+              <a:ext uri="{FF2B5EF4-FFF2-40B4-BE49-F238E27FC236}">
+                <a16:creationId xmlns:a16="http://schemas.microsoft.com/office/drawing/2014/main" id="{3740831C-0C11-4246-9E63-D61E3C19F87E}"/>
+              </a:ext>
+            </a:extLst>
+          </p:cNvPr>
+          <p:cNvSpPr/>
+          <p:nvPr/>
+        </p:nvSpPr>
+        <p:spPr>
+          <a:xfrm>
+            <a:off x="3564556" y="2204185"/>
+            <a:ext cx="2165684" cy="1145407"/>
+          </a:xfrm>
+          <a:prstGeom prst="rect">
+            <a:avLst/>
+          </a:prstGeom>
+        </p:spPr>
+        <p:style>
+          <a:lnRef idx="2">
+            <a:schemeClr val="accent1">
+              <a:shade val="50000"/>
+            </a:schemeClr>
+          </a:lnRef>
+          <a:fillRef idx="1">
+            <a:schemeClr val="accent1"/>
+          </a:fillRef>
+          <a:effectRef idx="0">
+            <a:schemeClr val="accent1"/>
+          </a:effectRef>
+          <a:fontRef idx="minor">
+            <a:schemeClr val="lt1"/>
+          </a:fontRef>
+        </p:style>
+        <p:txBody>
+          <a:bodyPr rtlCol="0" anchor="ctr"/>
+          <a:lstStyle/>
+          <a:p>
+            <a:pPr algn="ctr"/>
+            <a:r>
+              <a:rPr lang="en-US" dirty="0" err="1"/>
+              <a:t>prepocess</a:t>
+            </a:r>
+            <a:endParaRPr lang="en-US" dirty="0"/>
+          </a:p>
+        </p:txBody>
+      </p:sp>
+      <p:sp>
+        <p:nvSpPr>
+          <p:cNvPr id="39" name="Rectangle 38">
+            <a:extLst>
+              <a:ext uri="{FF2B5EF4-FFF2-40B4-BE49-F238E27FC236}">
+                <a16:creationId xmlns:a16="http://schemas.microsoft.com/office/drawing/2014/main" id="{58D9704B-FFEB-4594-9783-4DF260053FD7}"/>
+              </a:ext>
+            </a:extLst>
+          </p:cNvPr>
+          <p:cNvSpPr/>
+          <p:nvPr/>
+        </p:nvSpPr>
+        <p:spPr>
+          <a:xfrm>
+            <a:off x="6601326" y="2204185"/>
+            <a:ext cx="1982805" cy="1145407"/>
+          </a:xfrm>
+          <a:prstGeom prst="rect">
+            <a:avLst/>
+          </a:prstGeom>
+        </p:spPr>
+        <p:style>
+          <a:lnRef idx="2">
+            <a:schemeClr val="accent1">
+              <a:shade val="50000"/>
+            </a:schemeClr>
+          </a:lnRef>
+          <a:fillRef idx="1">
+            <a:schemeClr val="accent1"/>
+          </a:fillRef>
+          <a:effectRef idx="0">
+            <a:schemeClr val="accent1"/>
+          </a:effectRef>
+          <a:fontRef idx="minor">
+            <a:schemeClr val="lt1"/>
+          </a:fontRef>
+        </p:style>
+        <p:txBody>
+          <a:bodyPr rtlCol="0" anchor="ctr"/>
+          <a:lstStyle/>
+          <a:p>
+            <a:pPr algn="ctr"/>
+            <a:r>
+              <a:rPr lang="en-US" dirty="0"/>
+              <a:t>User input</a:t>
+            </a:r>
+          </a:p>
+        </p:txBody>
+      </p:sp>
+      <p:cxnSp>
+        <p:nvCxnSpPr>
+          <p:cNvPr id="41" name="Straight Arrow Connector 40">
+            <a:extLst>
+              <a:ext uri="{FF2B5EF4-FFF2-40B4-BE49-F238E27FC236}">
+                <a16:creationId xmlns:a16="http://schemas.microsoft.com/office/drawing/2014/main" id="{B7D8B88C-8E8F-426A-B536-4D8ECF2A8512}"/>
+              </a:ext>
+            </a:extLst>
+          </p:cNvPr>
+          <p:cNvCxnSpPr>
+            <a:stCxn id="38" idx="1"/>
+            <a:endCxn id="31" idx="3"/>
+          </p:cNvCxnSpPr>
+          <p:nvPr/>
+        </p:nvCxnSpPr>
+        <p:spPr>
+          <a:xfrm flipH="1">
+            <a:off x="3011104" y="2776889"/>
+            <a:ext cx="553452" cy="0"/>
+          </a:xfrm>
+          <a:prstGeom prst="straightConnector1">
+            <a:avLst/>
+          </a:prstGeom>
+          <a:ln>
+            <a:tailEnd type="triangle"/>
+          </a:ln>
+        </p:spPr>
+        <p:style>
+          <a:lnRef idx="1">
+            <a:schemeClr val="accent1"/>
+          </a:lnRef>
+          <a:fillRef idx="0">
+            <a:schemeClr val="accent1"/>
+          </a:fillRef>
+          <a:effectRef idx="0">
+            <a:schemeClr val="accent1"/>
+          </a:effectRef>
+          <a:fontRef idx="minor">
+            <a:schemeClr val="tx1"/>
+          </a:fontRef>
+        </p:style>
+      </p:cxnSp>
+      <p:cxnSp>
+        <p:nvCxnSpPr>
+          <p:cNvPr id="43" name="Straight Arrow Connector 42">
+            <a:extLst>
+              <a:ext uri="{FF2B5EF4-FFF2-40B4-BE49-F238E27FC236}">
+                <a16:creationId xmlns:a16="http://schemas.microsoft.com/office/drawing/2014/main" id="{0C42514B-9AD9-4BFD-BF7A-BA2031C4961A}"/>
+              </a:ext>
+            </a:extLst>
+          </p:cNvPr>
+          <p:cNvCxnSpPr>
+            <a:stCxn id="39" idx="1"/>
+            <a:endCxn id="38" idx="3"/>
+          </p:cNvCxnSpPr>
+          <p:nvPr/>
+        </p:nvCxnSpPr>
+        <p:spPr>
+          <a:xfrm flipH="1">
+            <a:off x="5730240" y="2776889"/>
+            <a:ext cx="871086" cy="0"/>
+          </a:xfrm>
+          <a:prstGeom prst="straightConnector1">
+            <a:avLst/>
+          </a:prstGeom>
+          <a:ln>
+            <a:tailEnd type="triangle"/>
+          </a:ln>
+        </p:spPr>
+        <p:style>
+          <a:lnRef idx="1">
+            <a:schemeClr val="accent1"/>
+          </a:lnRef>
+          <a:fillRef idx="0">
+            <a:schemeClr val="accent1"/>
+          </a:fillRef>
+          <a:effectRef idx="0">
+            <a:schemeClr val="accent1"/>
+          </a:effectRef>
+          <a:fontRef idx="minor">
+            <a:schemeClr val="tx1"/>
+          </a:fontRef>
+        </p:style>
+      </p:cxnSp>
+      <p:sp>
+        <p:nvSpPr>
+          <p:cNvPr id="44" name="Rectangle 43">
+            <a:extLst>
+              <a:ext uri="{FF2B5EF4-FFF2-40B4-BE49-F238E27FC236}">
+                <a16:creationId xmlns:a16="http://schemas.microsoft.com/office/drawing/2014/main" id="{71367C5E-898E-43CF-9FD6-FA43D7C975DE}"/>
+              </a:ext>
+            </a:extLst>
+          </p:cNvPr>
+          <p:cNvSpPr/>
+          <p:nvPr/>
+        </p:nvSpPr>
+        <p:spPr>
+          <a:xfrm>
+            <a:off x="3574182" y="4073891"/>
+            <a:ext cx="2156058" cy="526983"/>
+          </a:xfrm>
+          <a:prstGeom prst="rect">
+            <a:avLst/>
+          </a:prstGeom>
+        </p:spPr>
+        <p:style>
+          <a:lnRef idx="2">
+            <a:schemeClr val="accent1">
+              <a:shade val="50000"/>
+            </a:schemeClr>
+          </a:lnRef>
+          <a:fillRef idx="1">
+            <a:schemeClr val="accent1"/>
+          </a:fillRef>
+          <a:effectRef idx="0">
+            <a:schemeClr val="accent1"/>
+          </a:effectRef>
+          <a:fontRef idx="minor">
+            <a:schemeClr val="lt1"/>
+          </a:fontRef>
+        </p:style>
+        <p:txBody>
+          <a:bodyPr rtlCol="0" anchor="ctr"/>
+          <a:lstStyle/>
+          <a:p>
+            <a:pPr algn="ctr"/>
+            <a:r>
+              <a:rPr lang="en-US" dirty="0"/>
+              <a:t>negative</a:t>
+            </a:r>
+          </a:p>
+        </p:txBody>
+      </p:sp>
+      <p:sp>
+        <p:nvSpPr>
+          <p:cNvPr id="48" name="Rectangle 47">
+            <a:extLst>
+              <a:ext uri="{FF2B5EF4-FFF2-40B4-BE49-F238E27FC236}">
+                <a16:creationId xmlns:a16="http://schemas.microsoft.com/office/drawing/2014/main" id="{748A2845-2041-466E-93D7-846F29FBA2B5}"/>
+              </a:ext>
+            </a:extLst>
+          </p:cNvPr>
+          <p:cNvSpPr/>
+          <p:nvPr/>
+        </p:nvSpPr>
+        <p:spPr>
+          <a:xfrm>
+            <a:off x="3564556" y="4717580"/>
+            <a:ext cx="2156058" cy="526983"/>
+          </a:xfrm>
+          <a:prstGeom prst="rect">
+            <a:avLst/>
+          </a:prstGeom>
+        </p:spPr>
+        <p:style>
+          <a:lnRef idx="2">
+            <a:schemeClr val="accent1">
+              <a:shade val="50000"/>
+            </a:schemeClr>
+          </a:lnRef>
+          <a:fillRef idx="1">
+            <a:schemeClr val="accent1"/>
+          </a:fillRef>
+          <a:effectRef idx="0">
+            <a:schemeClr val="accent1"/>
+          </a:effectRef>
+          <a:fontRef idx="minor">
+            <a:schemeClr val="lt1"/>
+          </a:fontRef>
+        </p:style>
+        <p:txBody>
+          <a:bodyPr rtlCol="0" anchor="ctr"/>
+          <a:lstStyle/>
+          <a:p>
+            <a:pPr algn="ctr"/>
+            <a:r>
+              <a:rPr lang="en-US" dirty="0"/>
+              <a:t>Positive stage 1</a:t>
+            </a:r>
+          </a:p>
+        </p:txBody>
+      </p:sp>
+      <p:sp>
+        <p:nvSpPr>
+          <p:cNvPr id="49" name="Rectangle 48">
+            <a:extLst>
+              <a:ext uri="{FF2B5EF4-FFF2-40B4-BE49-F238E27FC236}">
+                <a16:creationId xmlns:a16="http://schemas.microsoft.com/office/drawing/2014/main" id="{E6B00CDE-4A40-45AA-8A8F-984376591C2D}"/>
+              </a:ext>
+            </a:extLst>
+          </p:cNvPr>
+          <p:cNvSpPr/>
+          <p:nvPr/>
+        </p:nvSpPr>
+        <p:spPr>
+          <a:xfrm>
+            <a:off x="3574182" y="5361269"/>
+            <a:ext cx="2156058" cy="526983"/>
+          </a:xfrm>
+          <a:prstGeom prst="rect">
+            <a:avLst/>
+          </a:prstGeom>
+        </p:spPr>
+        <p:style>
+          <a:lnRef idx="2">
+            <a:schemeClr val="accent1">
+              <a:shade val="50000"/>
+            </a:schemeClr>
+          </a:lnRef>
+          <a:fillRef idx="1">
+            <a:schemeClr val="accent1"/>
+          </a:fillRef>
+          <a:effectRef idx="0">
+            <a:schemeClr val="accent1"/>
+          </a:effectRef>
+          <a:fontRef idx="minor">
+            <a:schemeClr val="lt1"/>
+          </a:fontRef>
+        </p:style>
+        <p:txBody>
+          <a:bodyPr rtlCol="0" anchor="ctr"/>
+          <a:lstStyle/>
+          <a:p>
+            <a:pPr algn="ctr"/>
+            <a:r>
+              <a:rPr lang="en-US" dirty="0"/>
+              <a:t>Positive stage 2</a:t>
+            </a:r>
+          </a:p>
+        </p:txBody>
+      </p:sp>
+      <p:sp>
+        <p:nvSpPr>
+          <p:cNvPr id="50" name="Rectangle 49">
+            <a:extLst>
+              <a:ext uri="{FF2B5EF4-FFF2-40B4-BE49-F238E27FC236}">
+                <a16:creationId xmlns:a16="http://schemas.microsoft.com/office/drawing/2014/main" id="{761AD80E-210F-4998-A1E1-7DD6B6B72FED}"/>
+              </a:ext>
+            </a:extLst>
+          </p:cNvPr>
+          <p:cNvSpPr/>
+          <p:nvPr/>
+        </p:nvSpPr>
+        <p:spPr>
+          <a:xfrm>
+            <a:off x="3564556" y="6004958"/>
+            <a:ext cx="2156058" cy="526983"/>
+          </a:xfrm>
+          <a:prstGeom prst="rect">
+            <a:avLst/>
+          </a:prstGeom>
+        </p:spPr>
+        <p:style>
+          <a:lnRef idx="2">
+            <a:schemeClr val="accent1">
+              <a:shade val="50000"/>
+            </a:schemeClr>
+          </a:lnRef>
+          <a:fillRef idx="1">
+            <a:schemeClr val="accent1"/>
+          </a:fillRef>
+          <a:effectRef idx="0">
+            <a:schemeClr val="accent1"/>
+          </a:effectRef>
+          <a:fontRef idx="minor">
+            <a:schemeClr val="lt1"/>
+          </a:fontRef>
+        </p:style>
+        <p:txBody>
+          <a:bodyPr rtlCol="0" anchor="ctr"/>
+          <a:lstStyle/>
+          <a:p>
+            <a:pPr algn="ctr"/>
+            <a:r>
+              <a:rPr lang="en-US" dirty="0"/>
+              <a:t>Positive stage 3</a:t>
+            </a:r>
+          </a:p>
+        </p:txBody>
+      </p:sp>
+      <p:cxnSp>
+        <p:nvCxnSpPr>
+          <p:cNvPr id="52" name="Connector: Elbow 51">
+            <a:extLst>
+              <a:ext uri="{FF2B5EF4-FFF2-40B4-BE49-F238E27FC236}">
+                <a16:creationId xmlns:a16="http://schemas.microsoft.com/office/drawing/2014/main" id="{45ADD41C-90B2-4B9E-951E-A7DA32E04D2D}"/>
+              </a:ext>
+            </a:extLst>
+          </p:cNvPr>
+          <p:cNvCxnSpPr>
+            <a:stCxn id="31" idx="2"/>
+            <a:endCxn id="44" idx="1"/>
+          </p:cNvCxnSpPr>
+          <p:nvPr/>
+        </p:nvCxnSpPr>
+        <p:spPr>
+          <a:xfrm rot="16200000" flipH="1">
+            <a:off x="2199976" y="2963176"/>
+            <a:ext cx="987791" cy="1760621"/>
+          </a:xfrm>
+          <a:prstGeom prst="bentConnector2">
+            <a:avLst/>
+          </a:prstGeom>
+          <a:ln>
+            <a:tailEnd type="triangle"/>
+          </a:ln>
+        </p:spPr>
+        <p:style>
+          <a:lnRef idx="1">
+            <a:schemeClr val="accent1"/>
+          </a:lnRef>
+          <a:fillRef idx="0">
+            <a:schemeClr val="accent1"/>
+          </a:fillRef>
+          <a:effectRef idx="0">
+            <a:schemeClr val="accent1"/>
+          </a:effectRef>
+          <a:fontRef idx="minor">
+            <a:schemeClr val="tx1"/>
+          </a:fontRef>
+        </p:style>
+      </p:cxnSp>
+      <p:cxnSp>
+        <p:nvCxnSpPr>
+          <p:cNvPr id="54" name="Connector: Elbow 53">
+            <a:extLst>
+              <a:ext uri="{FF2B5EF4-FFF2-40B4-BE49-F238E27FC236}">
+                <a16:creationId xmlns:a16="http://schemas.microsoft.com/office/drawing/2014/main" id="{86F9A09F-1F90-46E4-AC7C-FDF531B9A1A7}"/>
+              </a:ext>
+            </a:extLst>
+          </p:cNvPr>
+          <p:cNvCxnSpPr>
+            <a:stCxn id="31" idx="2"/>
+            <a:endCxn id="48" idx="1"/>
+          </p:cNvCxnSpPr>
+          <p:nvPr/>
+        </p:nvCxnSpPr>
+        <p:spPr>
+          <a:xfrm rot="16200000" flipH="1">
+            <a:off x="1873318" y="3289834"/>
+            <a:ext cx="1631480" cy="1750995"/>
+          </a:xfrm>
+          <a:prstGeom prst="bentConnector2">
+            <a:avLst/>
+          </a:prstGeom>
+          <a:ln>
+            <a:tailEnd type="triangle"/>
+          </a:ln>
+        </p:spPr>
+        <p:style>
+          <a:lnRef idx="1">
+            <a:schemeClr val="accent1"/>
+          </a:lnRef>
+          <a:fillRef idx="0">
+            <a:schemeClr val="accent1"/>
+          </a:fillRef>
+          <a:effectRef idx="0">
+            <a:schemeClr val="accent1"/>
+          </a:effectRef>
+          <a:fontRef idx="minor">
+            <a:schemeClr val="tx1"/>
+          </a:fontRef>
+        </p:style>
+      </p:cxnSp>
+      <p:cxnSp>
+        <p:nvCxnSpPr>
+          <p:cNvPr id="56" name="Connector: Elbow 55">
+            <a:extLst>
+              <a:ext uri="{FF2B5EF4-FFF2-40B4-BE49-F238E27FC236}">
+                <a16:creationId xmlns:a16="http://schemas.microsoft.com/office/drawing/2014/main" id="{9AD66A2A-9274-41BF-8705-757D02F296C6}"/>
+              </a:ext>
+            </a:extLst>
+          </p:cNvPr>
+          <p:cNvCxnSpPr>
+            <a:stCxn id="31" idx="2"/>
+            <a:endCxn id="49" idx="1"/>
+          </p:cNvCxnSpPr>
+          <p:nvPr/>
+        </p:nvCxnSpPr>
+        <p:spPr>
+          <a:xfrm rot="16200000" flipH="1">
+            <a:off x="1556287" y="3606865"/>
+            <a:ext cx="2275169" cy="1760621"/>
+          </a:xfrm>
+          <a:prstGeom prst="bentConnector2">
+            <a:avLst/>
+          </a:prstGeom>
+          <a:ln>
+            <a:tailEnd type="triangle"/>
+          </a:ln>
+        </p:spPr>
+        <p:style>
+          <a:lnRef idx="1">
+            <a:schemeClr val="accent1"/>
+          </a:lnRef>
+          <a:fillRef idx="0">
+            <a:schemeClr val="accent1"/>
+          </a:fillRef>
+          <a:effectRef idx="0">
+            <a:schemeClr val="accent1"/>
+          </a:effectRef>
+          <a:fontRef idx="minor">
+            <a:schemeClr val="tx1"/>
+          </a:fontRef>
+        </p:style>
+      </p:cxnSp>
+      <p:cxnSp>
+        <p:nvCxnSpPr>
+          <p:cNvPr id="58" name="Connector: Elbow 57">
+            <a:extLst>
+              <a:ext uri="{FF2B5EF4-FFF2-40B4-BE49-F238E27FC236}">
+                <a16:creationId xmlns:a16="http://schemas.microsoft.com/office/drawing/2014/main" id="{01E372E9-A48E-4176-9102-DC32334373FB}"/>
+              </a:ext>
+            </a:extLst>
+          </p:cNvPr>
+          <p:cNvCxnSpPr>
+            <a:stCxn id="31" idx="2"/>
+            <a:endCxn id="50" idx="1"/>
+          </p:cNvCxnSpPr>
+          <p:nvPr/>
+        </p:nvCxnSpPr>
+        <p:spPr>
+          <a:xfrm rot="16200000" flipH="1">
+            <a:off x="1229629" y="3933523"/>
+            <a:ext cx="2918858" cy="1750995"/>
+          </a:xfrm>
+          <a:prstGeom prst="bentConnector2">
+            <a:avLst/>
+          </a:prstGeom>
+          <a:ln>
+            <a:tailEnd type="triangle"/>
+          </a:ln>
+        </p:spPr>
+        <p:style>
+          <a:lnRef idx="1">
+            <a:schemeClr val="accent1"/>
+          </a:lnRef>
+          <a:fillRef idx="0">
+            <a:schemeClr val="accent1"/>
+          </a:fillRef>
+          <a:effectRef idx="0">
+            <a:schemeClr val="accent1"/>
+          </a:effectRef>
+          <a:fontRef idx="minor">
+            <a:schemeClr val="tx1"/>
+          </a:fontRef>
+        </p:style>
+      </p:cxnSp>
+      <p:sp>
+        <p:nvSpPr>
+          <p:cNvPr id="61" name="Rectangle 60">
+            <a:extLst>
+              <a:ext uri="{FF2B5EF4-FFF2-40B4-BE49-F238E27FC236}">
+                <a16:creationId xmlns:a16="http://schemas.microsoft.com/office/drawing/2014/main" id="{7DA4A3AF-D6B6-4C00-B204-423B3937FE7E}"/>
+              </a:ext>
+            </a:extLst>
+          </p:cNvPr>
+          <p:cNvSpPr/>
+          <p:nvPr/>
+        </p:nvSpPr>
+        <p:spPr>
+          <a:xfrm>
+            <a:off x="616017" y="673767"/>
+            <a:ext cx="2395087" cy="673175"/>
+          </a:xfrm>
+          <a:prstGeom prst="rect">
+            <a:avLst/>
+          </a:prstGeom>
+        </p:spPr>
+        <p:style>
+          <a:lnRef idx="2">
+            <a:schemeClr val="accent1">
+              <a:shade val="50000"/>
+            </a:schemeClr>
+          </a:lnRef>
+          <a:fillRef idx="1">
+            <a:schemeClr val="accent1"/>
+          </a:fillRef>
+          <a:effectRef idx="0">
+            <a:schemeClr val="accent1"/>
+          </a:effectRef>
+          <a:fontRef idx="minor">
+            <a:schemeClr val="lt1"/>
+          </a:fontRef>
+        </p:style>
+        <p:txBody>
+          <a:bodyPr rtlCol="0" anchor="ctr"/>
+          <a:lstStyle/>
+          <a:p>
+            <a:pPr algn="ctr"/>
+            <a:r>
+              <a:rPr lang="en-US" dirty="0"/>
+              <a:t>training</a:t>
+            </a:r>
+          </a:p>
+        </p:txBody>
+      </p:sp>
+      <p:cxnSp>
+        <p:nvCxnSpPr>
+          <p:cNvPr id="69" name="Connector: Elbow 68">
+            <a:extLst>
+              <a:ext uri="{FF2B5EF4-FFF2-40B4-BE49-F238E27FC236}">
+                <a16:creationId xmlns:a16="http://schemas.microsoft.com/office/drawing/2014/main" id="{5CCA96CB-E0D7-488B-8366-BCD613F7BDD8}"/>
+              </a:ext>
+            </a:extLst>
+          </p:cNvPr>
+          <p:cNvCxnSpPr>
+            <a:cxnSpLocks/>
+            <a:stCxn id="28" idx="1"/>
+            <a:endCxn id="61" idx="3"/>
+          </p:cNvCxnSpPr>
+          <p:nvPr/>
+        </p:nvCxnSpPr>
+        <p:spPr>
+          <a:xfrm rot="10800000" flipV="1">
+            <a:off x="3011104" y="489085"/>
+            <a:ext cx="1078028" cy="521269"/>
+          </a:xfrm>
+          <a:prstGeom prst="bentConnector3">
+            <a:avLst/>
+          </a:prstGeom>
+          <a:ln>
+            <a:tailEnd type="triangle"/>
+          </a:ln>
+        </p:spPr>
+        <p:style>
+          <a:lnRef idx="1">
+            <a:schemeClr val="accent1"/>
+          </a:lnRef>
+          <a:fillRef idx="0">
+            <a:schemeClr val="accent1"/>
+          </a:fillRef>
+          <a:effectRef idx="0">
+            <a:schemeClr val="accent1"/>
+          </a:effectRef>
+          <a:fontRef idx="minor">
+            <a:schemeClr val="tx1"/>
+          </a:fontRef>
+        </p:style>
+      </p:cxnSp>
+      <p:cxnSp>
+        <p:nvCxnSpPr>
+          <p:cNvPr id="71" name="Connector: Elbow 70">
+            <a:extLst>
+              <a:ext uri="{FF2B5EF4-FFF2-40B4-BE49-F238E27FC236}">
+                <a16:creationId xmlns:a16="http://schemas.microsoft.com/office/drawing/2014/main" id="{46803560-7E6C-4898-AFEC-635663F5C5B0}"/>
+              </a:ext>
+            </a:extLst>
+          </p:cNvPr>
+          <p:cNvCxnSpPr>
+            <a:cxnSpLocks/>
+            <a:stCxn id="30" idx="1"/>
+            <a:endCxn id="61" idx="3"/>
+          </p:cNvCxnSpPr>
+          <p:nvPr/>
+        </p:nvCxnSpPr>
+        <p:spPr>
+          <a:xfrm rot="10800000">
+            <a:off x="3011104" y="1010356"/>
+            <a:ext cx="1087654" cy="469531"/>
+          </a:xfrm>
+          <a:prstGeom prst="bentConnector3">
+            <a:avLst/>
+          </a:prstGeom>
+          <a:ln>
+            <a:tailEnd type="triangle"/>
+          </a:ln>
+        </p:spPr>
+        <p:style>
+          <a:lnRef idx="1">
+            <a:schemeClr val="accent1"/>
+          </a:lnRef>
+          <a:fillRef idx="0">
+            <a:schemeClr val="accent1"/>
+          </a:fillRef>
+          <a:effectRef idx="0">
+            <a:schemeClr val="accent1"/>
+          </a:effectRef>
+          <a:fontRef idx="minor">
+            <a:schemeClr val="tx1"/>
+          </a:fontRef>
+        </p:style>
+      </p:cxnSp>
+      <p:cxnSp>
+        <p:nvCxnSpPr>
+          <p:cNvPr id="81" name="Straight Arrow Connector 80">
+            <a:extLst>
+              <a:ext uri="{FF2B5EF4-FFF2-40B4-BE49-F238E27FC236}">
+                <a16:creationId xmlns:a16="http://schemas.microsoft.com/office/drawing/2014/main" id="{14375105-80E1-4216-93E6-3AFB4287F191}"/>
+              </a:ext>
+            </a:extLst>
+          </p:cNvPr>
+          <p:cNvCxnSpPr>
+            <a:stCxn id="61" idx="2"/>
+            <a:endCxn id="31" idx="0"/>
+          </p:cNvCxnSpPr>
+          <p:nvPr/>
+        </p:nvCxnSpPr>
+        <p:spPr>
+          <a:xfrm>
+            <a:off x="1813561" y="1346942"/>
+            <a:ext cx="0" cy="857244"/>
+          </a:xfrm>
+          <a:prstGeom prst="straightConnector1">
+            <a:avLst/>
+          </a:prstGeom>
+          <a:ln>
+            <a:tailEnd type="triangle"/>
+          </a:ln>
+        </p:spPr>
+        <p:style>
+          <a:lnRef idx="1">
+            <a:schemeClr val="accent1"/>
+          </a:lnRef>
+          <a:fillRef idx="0">
+            <a:schemeClr val="accent1"/>
+          </a:fillRef>
+          <a:effectRef idx="0">
+            <a:schemeClr val="accent1"/>
+          </a:effectRef>
+          <a:fontRef idx="minor">
+            <a:schemeClr val="tx1"/>
+          </a:fontRef>
+        </p:style>
+      </p:cxnSp>
+    </p:spTree>
+    <p:extLst>
+      <p:ext uri="{BB962C8B-B14F-4D97-AF65-F5344CB8AC3E}">
+        <p14:creationId xmlns:p14="http://schemas.microsoft.com/office/powerpoint/2010/main" val="2458939011"/>
       </p:ext>
     </p:extLst>
   </p:cSld>

</xml_diff>